<commit_message>
Updated results with larger sequence threshold
</commit_message>
<xml_diff>
--- a/figs/Chart.pptx
+++ b/figs/Chart.pptx
@@ -6,6 +6,7 @@
   </p:sldMasterIdLst>
   <p:sldIdLst>
     <p:sldId id="259" r:id="rId2"/>
+    <p:sldId id="260" r:id="rId3"/>
   </p:sldIdLst>
   <p:sldSz cx="9144000" cy="6858000" type="screen4x3"/>
   <p:notesSz cx="7302500" cy="9588500"/>
@@ -134,19 +135,47 @@
       </a:defRPr>
     </a:lvl9pPr>
   </p:defaultTextStyle>
+  <p:extLst>
+    <p:ext uri="{EFAFB233-063F-42B5-8137-9DF3F51BA10A}">
+      <p15:sldGuideLst xmlns:p15="http://schemas.microsoft.com/office/powerpoint/2012/main">
+        <p15:guide id="1" orient="horz" pos="2160">
+          <p15:clr>
+            <a:srgbClr val="A4A3A4"/>
+          </p15:clr>
+        </p15:guide>
+        <p15:guide id="2" pos="2880">
+          <p15:clr>
+            <a:srgbClr val="A4A3A4"/>
+          </p15:clr>
+        </p15:guide>
+      </p15:sldGuideLst>
+    </p:ext>
+  </p:extLst>
 </p:presentation>
 </file>
 
 <file path=ppt/charts/chart1.xml><?xml version="1.0" encoding="utf-8"?>
 <c:chartSpace xmlns:c="http://schemas.openxmlformats.org/drawingml/2006/chart" xmlns:a="http://schemas.openxmlformats.org/drawingml/2006/main" xmlns:r="http://schemas.openxmlformats.org/officeDocument/2006/relationships">
+  <c:date1904 val="0"/>
   <c:lang val="en-US"/>
+  <c:roundedCorners val="0"/>
+  <mc:AlternateContent xmlns:mc="http://schemas.openxmlformats.org/markup-compatibility/2006">
+    <mc:Choice xmlns:c14="http://schemas.microsoft.com/office/drawing/2007/8/2/chart" Requires="c14">
+      <c14:style val="102"/>
+    </mc:Choice>
+    <mc:Fallback>
+      <c:style val="2"/>
+    </mc:Fallback>
+  </mc:AlternateContent>
   <c:clrMapOvr bg1="lt1" tx1="dk1" bg2="lt2" tx2="dk2" accent1="accent1" accent2="accent2" accent3="accent3" accent4="accent4" accent5="accent5" accent6="accent6" hlink="hlink" folHlink="folHlink"/>
   <c:chart>
+    <c:autoTitleDeleted val="0"/>
     <c:plotArea>
       <c:layout/>
       <c:barChart>
         <c:barDir val="col"/>
         <c:grouping val="clustered"/>
+        <c:varyColors val="0"/>
         <c:ser>
           <c:idx val="0"/>
           <c:order val="0"/>
@@ -179,6 +208,7 @@
               </a:solidFill>
             </a:ln>
           </c:spPr>
+          <c:invertIfNegative val="0"/>
           <c:cat>
             <c:strRef>
               <c:f>Effectiveness!$A$27:$A$29</c:f>
@@ -247,6 +277,7 @@
               </a:solidFill>
             </a:ln>
           </c:spPr>
+          <c:invertIfNegative val="0"/>
           <c:cat>
             <c:strRef>
               <c:f>Effectiveness!$A$27:$A$29</c:f>
@@ -283,15 +314,28 @@
             </c:numRef>
           </c:val>
         </c:ser>
-        <c:axId val="68803968"/>
-        <c:axId val="69076096"/>
+        <c:dLbls>
+          <c:showLegendKey val="0"/>
+          <c:showVal val="0"/>
+          <c:showCatName val="0"/>
+          <c:showSerName val="0"/>
+          <c:showPercent val="0"/>
+          <c:showBubbleSize val="0"/>
+        </c:dLbls>
+        <c:gapWidth val="150"/>
+        <c:axId val="185964144"/>
+        <c:axId val="185961984"/>
       </c:barChart>
       <c:catAx>
-        <c:axId val="68803968"/>
+        <c:axId val="185964144"/>
         <c:scaling>
           <c:orientation val="minMax"/>
         </c:scaling>
+        <c:delete val="0"/>
         <c:axPos val="b"/>
+        <c:numFmt formatCode="General" sourceLinked="0"/>
+        <c:majorTickMark val="out"/>
+        <c:minorTickMark val="none"/>
         <c:tickLblPos val="nextTo"/>
         <c:txPr>
           <a:bodyPr/>
@@ -305,18 +349,20 @@
             <a:endParaRPr lang="en-US"/>
           </a:p>
         </c:txPr>
-        <c:crossAx val="69076096"/>
+        <c:crossAx val="185961984"/>
         <c:crosses val="autoZero"/>
         <c:auto val="1"/>
         <c:lblAlgn val="ctr"/>
         <c:lblOffset val="100"/>
+        <c:noMultiLvlLbl val="0"/>
       </c:catAx>
       <c:valAx>
-        <c:axId val="69076096"/>
+        <c:axId val="185961984"/>
         <c:scaling>
           <c:orientation val="minMax"/>
           <c:max val="100"/>
         </c:scaling>
+        <c:delete val="0"/>
         <c:axPos val="l"/>
         <c:majorGridlines>
           <c:spPr>
@@ -330,6 +376,8 @@
           </c:spPr>
         </c:majorGridlines>
         <c:numFmt formatCode="0" sourceLinked="0"/>
+        <c:majorTickMark val="out"/>
+        <c:minorTickMark val="none"/>
         <c:tickLblPos val="nextTo"/>
         <c:txPr>
           <a:bodyPr/>
@@ -341,7 +389,7 @@
             <a:endParaRPr lang="en-US"/>
           </a:p>
         </c:txPr>
-        <c:crossAx val="68803968"/>
+        <c:crossAx val="185964144"/>
         <c:crosses val="autoZero"/>
         <c:crossBetween val="between"/>
         <c:majorUnit val="20"/>
@@ -350,6 +398,7 @@
     <c:legend>
       <c:legendPos val="b"/>
       <c:layout/>
+      <c:overlay val="0"/>
       <c:txPr>
         <a:bodyPr/>
         <a:lstStyle/>
@@ -364,8 +413,293 @@
       </c:txPr>
     </c:legend>
     <c:plotVisOnly val="1"/>
+    <c:dispBlanksAs val="gap"/>
+    <c:showDLblsOverMax val="0"/>
   </c:chart>
-  <c:externalData r:id="rId2"/>
+  <c:externalData r:id="rId2">
+    <c:autoUpdate val="0"/>
+  </c:externalData>
+</c:chartSpace>
+</file>
+
+<file path=ppt/charts/chart2.xml><?xml version="1.0" encoding="utf-8"?>
+<c:chartSpace xmlns:c="http://schemas.openxmlformats.org/drawingml/2006/chart" xmlns:a="http://schemas.openxmlformats.org/drawingml/2006/main" xmlns:r="http://schemas.openxmlformats.org/officeDocument/2006/relationships">
+  <c:date1904 val="0"/>
+  <c:lang val="en-US"/>
+  <c:roundedCorners val="0"/>
+  <mc:AlternateContent xmlns:mc="http://schemas.openxmlformats.org/markup-compatibility/2006">
+    <mc:Choice xmlns:c14="http://schemas.microsoft.com/office/drawing/2007/8/2/chart" Requires="c14">
+      <c14:style val="102"/>
+    </mc:Choice>
+    <mc:Fallback>
+      <c:style val="2"/>
+    </mc:Fallback>
+  </mc:AlternateContent>
+  <c:chart>
+    <c:autoTitleDeleted val="0"/>
+    <c:plotArea>
+      <c:layout/>
+      <c:barChart>
+        <c:barDir val="col"/>
+        <c:grouping val="clustered"/>
+        <c:varyColors val="0"/>
+        <c:ser>
+          <c:idx val="0"/>
+          <c:order val="0"/>
+          <c:tx>
+            <c:strRef>
+              <c:f>Effectiveness!$B$26</c:f>
+              <c:strCache>
+                <c:ptCount val="1"/>
+                <c:pt idx="0">
+                  <c:v>BUSTER</c:v>
+                </c:pt>
+              </c:strCache>
+            </c:strRef>
+          </c:tx>
+          <c:spPr>
+            <a:solidFill>
+              <a:schemeClr val="tx1">
+                <a:lumMod val="50000"/>
+                <a:lumOff val="50000"/>
+              </a:schemeClr>
+            </a:solidFill>
+            <a:ln>
+              <a:solidFill>
+                <a:schemeClr val="tx1">
+                  <a:lumMod val="50000"/>
+                  <a:lumOff val="50000"/>
+                </a:schemeClr>
+              </a:solidFill>
+            </a:ln>
+          </c:spPr>
+          <c:invertIfNegative val="0"/>
+          <c:cat>
+            <c:strRef>
+              <c:f>Effectiveness!$A$27:$A$29</c:f>
+              <c:strCache>
+                <c:ptCount val="3"/>
+                <c:pt idx="0">
+                  <c:v>Cebu-pacific</c:v>
+                </c:pt>
+                <c:pt idx="1">
+                  <c:v>jBilling</c:v>
+                </c:pt>
+                <c:pt idx="2">
+                  <c:v>App</c:v>
+                </c:pt>
+              </c:strCache>
+            </c:strRef>
+          </c:cat>
+          <c:val>
+            <c:numRef>
+              <c:f>Effectiveness!$B$27:$B$29</c:f>
+              <c:numCache>
+                <c:formatCode>0.00</c:formatCode>
+                <c:ptCount val="3"/>
+                <c:pt idx="0">
+                  <c:v>100</c:v>
+                </c:pt>
+                <c:pt idx="1">
+                  <c:v>96.15384615384616</c:v>
+                </c:pt>
+                <c:pt idx="2">
+                  <c:v>100</c:v>
+                </c:pt>
+              </c:numCache>
+            </c:numRef>
+          </c:val>
+        </c:ser>
+        <c:ser>
+          <c:idx val="1"/>
+          <c:order val="1"/>
+          <c:tx>
+            <c:strRef>
+              <c:f>Effectiveness!$C$26</c:f>
+              <c:strCache>
+                <c:ptCount val="1"/>
+                <c:pt idx="0">
+                  <c:v>EXHAUST</c:v>
+                </c:pt>
+              </c:strCache>
+            </c:strRef>
+          </c:tx>
+          <c:spPr>
+            <a:solidFill>
+              <a:schemeClr val="bg1">
+                <a:lumMod val="85000"/>
+              </a:schemeClr>
+            </a:solidFill>
+            <a:ln>
+              <a:solidFill>
+                <a:schemeClr val="tx1">
+                  <a:lumMod val="50000"/>
+                  <a:lumOff val="50000"/>
+                </a:schemeClr>
+              </a:solidFill>
+            </a:ln>
+          </c:spPr>
+          <c:invertIfNegative val="0"/>
+          <c:cat>
+            <c:strRef>
+              <c:f>Effectiveness!$A$27:$A$29</c:f>
+              <c:strCache>
+                <c:ptCount val="3"/>
+                <c:pt idx="0">
+                  <c:v>Cebu-pacific</c:v>
+                </c:pt>
+                <c:pt idx="1">
+                  <c:v>jBilling</c:v>
+                </c:pt>
+                <c:pt idx="2">
+                  <c:v>App</c:v>
+                </c:pt>
+              </c:strCache>
+            </c:strRef>
+          </c:cat>
+          <c:val>
+            <c:numRef>
+              <c:f>Effectiveness!$C$27:$C$29</c:f>
+              <c:numCache>
+                <c:formatCode>0.00</c:formatCode>
+                <c:ptCount val="3"/>
+                <c:pt idx="0">
+                  <c:v>54.838709677419352</c:v>
+                </c:pt>
+                <c:pt idx="1">
+                  <c:v>96.15384615384616</c:v>
+                </c:pt>
+                <c:pt idx="2">
+                  <c:v>80</c:v>
+                </c:pt>
+              </c:numCache>
+            </c:numRef>
+          </c:val>
+        </c:ser>
+        <c:dLbls>
+          <c:showLegendKey val="0"/>
+          <c:showVal val="0"/>
+          <c:showCatName val="0"/>
+          <c:showSerName val="0"/>
+          <c:showPercent val="0"/>
+          <c:showBubbleSize val="0"/>
+        </c:dLbls>
+        <c:gapWidth val="150"/>
+        <c:axId val="313769912"/>
+        <c:axId val="313771480"/>
+      </c:barChart>
+      <c:catAx>
+        <c:axId val="313769912"/>
+        <c:scaling>
+          <c:orientation val="minMax"/>
+        </c:scaling>
+        <c:delete val="0"/>
+        <c:axPos val="b"/>
+        <c:numFmt formatCode="General" sourceLinked="1"/>
+        <c:majorTickMark val="out"/>
+        <c:minorTickMark val="none"/>
+        <c:tickLblPos val="nextTo"/>
+        <c:txPr>
+          <a:bodyPr/>
+          <a:lstStyle/>
+          <a:p>
+            <a:pPr>
+              <a:defRPr sz="1400">
+                <a:latin typeface="Calibri" panose="020F0502020204030204" pitchFamily="34" charset="0"/>
+                <a:cs typeface="Calibri" panose="020F0502020204030204" pitchFamily="34" charset="0"/>
+              </a:defRPr>
+            </a:pPr>
+            <a:endParaRPr lang="en-US"/>
+          </a:p>
+        </c:txPr>
+        <c:crossAx val="313771480"/>
+        <c:crosses val="autoZero"/>
+        <c:auto val="1"/>
+        <c:lblAlgn val="ctr"/>
+        <c:lblOffset val="100"/>
+        <c:noMultiLvlLbl val="0"/>
+      </c:catAx>
+      <c:valAx>
+        <c:axId val="313771480"/>
+        <c:scaling>
+          <c:orientation val="minMax"/>
+          <c:max val="100"/>
+        </c:scaling>
+        <c:delete val="0"/>
+        <c:axPos val="l"/>
+        <c:majorGridlines>
+          <c:spPr>
+            <a:ln>
+              <a:solidFill>
+                <a:schemeClr val="bg1">
+                  <a:lumMod val="65000"/>
+                </a:schemeClr>
+              </a:solidFill>
+            </a:ln>
+          </c:spPr>
+        </c:majorGridlines>
+        <c:numFmt formatCode="0" sourceLinked="0"/>
+        <c:majorTickMark val="out"/>
+        <c:minorTickMark val="none"/>
+        <c:tickLblPos val="nextTo"/>
+        <c:txPr>
+          <a:bodyPr/>
+          <a:lstStyle/>
+          <a:p>
+            <a:pPr>
+              <a:defRPr sz="1200">
+                <a:latin typeface="Calibri" panose="020F0502020204030204" pitchFamily="34" charset="0"/>
+                <a:cs typeface="Calibri" panose="020F0502020204030204" pitchFamily="34" charset="0"/>
+              </a:defRPr>
+            </a:pPr>
+            <a:endParaRPr lang="en-US"/>
+          </a:p>
+        </c:txPr>
+        <c:crossAx val="313769912"/>
+        <c:crosses val="autoZero"/>
+        <c:crossBetween val="between"/>
+        <c:majorUnit val="20"/>
+      </c:valAx>
+    </c:plotArea>
+    <c:legend>
+      <c:legendPos val="t"/>
+      <c:layout>
+        <c:manualLayout>
+          <c:xMode val="edge"/>
+          <c:yMode val="edge"/>
+          <c:x val="0.28354352580927389"/>
+          <c:y val="7.407407407407407E-2"/>
+          <c:w val="0.42735717410323709"/>
+          <c:h val="0.10610637212015164"/>
+        </c:manualLayout>
+      </c:layout>
+      <c:overlay val="0"/>
+      <c:txPr>
+        <a:bodyPr/>
+        <a:lstStyle/>
+        <a:p>
+          <a:pPr>
+            <a:defRPr sz="1300">
+              <a:latin typeface="Calibri" panose="020F0502020204030204" pitchFamily="34" charset="0"/>
+              <a:cs typeface="Calibri" panose="020F0502020204030204" pitchFamily="34" charset="0"/>
+            </a:defRPr>
+          </a:pPr>
+          <a:endParaRPr lang="en-US"/>
+        </a:p>
+      </c:txPr>
+    </c:legend>
+    <c:plotVisOnly val="1"/>
+    <c:dispBlanksAs val="gap"/>
+    <c:showDLblsOverMax val="0"/>
+  </c:chart>
+  <c:spPr>
+    <a:ln>
+      <a:noFill/>
+    </a:ln>
+  </c:spPr>
+  <c:externalData r:id="rId1">
+    <c:autoUpdate val="0"/>
+  </c:externalData>
 </c:chartSpace>
 </file>
 
@@ -3671,6 +4005,60 @@
         </a:graphic>
       </p:graphicFrame>
     </p:spTree>
+  </p:cSld>
+  <p:clrMapOvr>
+    <a:masterClrMapping/>
+  </p:clrMapOvr>
+</p:sld>
+</file>
+
+<file path=ppt/slides/slide2.xml><?xml version="1.0" encoding="utf-8"?>
+<p:sld xmlns:a="http://schemas.openxmlformats.org/drawingml/2006/main" xmlns:r="http://schemas.openxmlformats.org/officeDocument/2006/relationships" xmlns:p="http://schemas.openxmlformats.org/presentationml/2006/main">
+  <p:cSld>
+    <p:spTree>
+      <p:nvGrpSpPr>
+        <p:cNvPr id="1" name=""/>
+        <p:cNvGrpSpPr/>
+        <p:nvPr/>
+      </p:nvGrpSpPr>
+      <p:grpSpPr>
+        <a:xfrm>
+          <a:off x="0" y="0"/>
+          <a:ext cx="0" cy="0"/>
+          <a:chOff x="0" y="0"/>
+          <a:chExt cx="0" cy="0"/>
+        </a:xfrm>
+      </p:grpSpPr>
+      <p:graphicFrame>
+        <p:nvGraphicFramePr>
+          <p:cNvPr id="4" name="Chart 3"/>
+          <p:cNvGraphicFramePr>
+            <a:graphicFrameLocks/>
+          </p:cNvGraphicFramePr>
+          <p:nvPr>
+            <p:extLst>
+              <p:ext uri="{D42A27DB-BD31-4B8C-83A1-F6EECF244321}">
+                <p14:modId xmlns:p14="http://schemas.microsoft.com/office/powerpoint/2010/main" val="2541493760"/>
+              </p:ext>
+            </p:extLst>
+          </p:nvPr>
+        </p:nvGraphicFramePr>
+        <p:xfrm>
+          <a:off x="152400" y="24161"/>
+          <a:ext cx="4572000" cy="2743200"/>
+        </p:xfrm>
+        <a:graphic>
+          <a:graphicData uri="http://schemas.openxmlformats.org/drawingml/2006/chart">
+            <c:chart xmlns:c="http://schemas.openxmlformats.org/drawingml/2006/chart" xmlns:r="http://schemas.openxmlformats.org/officeDocument/2006/relationships" r:id="rId2"/>
+          </a:graphicData>
+        </a:graphic>
+      </p:graphicFrame>
+    </p:spTree>
+    <p:extLst>
+      <p:ext uri="{BB962C8B-B14F-4D97-AF65-F5344CB8AC3E}">
+        <p14:creationId xmlns:p14="http://schemas.microsoft.com/office/powerpoint/2010/main" val="3094825739"/>
+      </p:ext>
+    </p:extLst>
   </p:cSld>
   <p:clrMapOvr>
     <a:masterClrMapping/>

</xml_diff>